<commit_message>
added new demo project
</commit_message>
<xml_diff>
--- a/docs/microservices.pptx
+++ b/docs/microservices.pptx
@@ -137,21 +137,21 @@
             <p14:sldId id="266"/>
             <p14:sldId id="267"/>
             <p14:sldId id="268"/>
+            <p14:sldId id="265"/>
             <p14:sldId id="269"/>
             <p14:sldId id="275"/>
             <p14:sldId id="276"/>
             <p14:sldId id="277"/>
             <p14:sldId id="278"/>
-            <p14:sldId id="265"/>
           </p14:sldIdLst>
         </p14:section>
         <p14:section name="Dubbo&amp;SpringCloud" id="{93f40a50-2906-496e-9e04-2a35dd68fb13}">
           <p14:sldIdLst>
             <p14:sldId id="270"/>
             <p14:sldId id="271"/>
-            <p14:sldId id="274"/>
             <p14:sldId id="272"/>
             <p14:sldId id="273"/>
+            <p14:sldId id="274"/>
           </p14:sldIdLst>
         </p14:section>
         <p14:section name="Microservice patterns" id="{ebddfbfb-3754-48c4-ae9f-331de29c86d3}">
@@ -4717,28 +4717,44 @@
         <p:txBody>
           <a:bodyPr/>
           <a:p>
-            <a:endParaRPr lang="zh-CN" altLang="en-US"/>
-          </a:p>
-        </p:txBody>
-      </p:sp>
-      <p:sp>
-        <p:nvSpPr>
-          <p:cNvPr id="3" name="内容占位符 2"/>
-          <p:cNvSpPr>
-            <a:spLocks noGrp="1"/>
-          </p:cNvSpPr>
-          <p:nvPr>
-            <p:ph idx="1"/>
-          </p:nvPr>
-        </p:nvSpPr>
-        <p:spPr/>
-        <p:txBody>
-          <a:bodyPr/>
-          <a:p>
-            <a:endParaRPr lang="zh-CN" altLang="en-US"/>
-          </a:p>
-        </p:txBody>
-      </p:sp>
+            <a:r>
+              <a:rPr lang="en-US" altLang="zh-CN"/>
+              <a:t>Spring Cloud</a:t>
+            </a:r>
+            <a:endParaRPr lang="en-US" altLang="zh-CN"/>
+          </a:p>
+        </p:txBody>
+      </p:sp>
+      <p:pic>
+        <p:nvPicPr>
+          <p:cNvPr id="4" name="图片 3" descr="diagram-distributed-systems"/>
+          <p:cNvPicPr>
+            <a:picLocks noChangeAspect="1"/>
+          </p:cNvPicPr>
+          <p:nvPr/>
+        </p:nvPicPr>
+        <p:blipFill>
+          <a:blip r:embed="rId1">
+            <a:extLst>
+              <a:ext uri="{96DAC541-7B7A-43D3-8B79-37D633B846F1}">
+                <asvg:svgBlip xmlns:asvg="http://schemas.microsoft.com/office/drawing/2016/SVG/main" r:embed="rId2"/>
+              </a:ext>
+            </a:extLst>
+          </a:blip>
+          <a:stretch>
+            <a:fillRect/>
+          </a:stretch>
+        </p:blipFill>
+        <p:spPr>
+          <a:xfrm>
+            <a:off x="838200" y="1827530"/>
+            <a:ext cx="10029825" cy="4657725"/>
+          </a:xfrm>
+          <a:prstGeom prst="rect">
+            <a:avLst/>
+          </a:prstGeom>
+        </p:spPr>
+      </p:pic>
     </p:spTree>
   </p:cSld>
   <p:clrMapOvr>

</xml_diff>